<commit_message>
Metodologia e Resultados Termometro OK
</commit_message>
<xml_diff>
--- a/Resources/Images/Figuras.pptx
+++ b/Resources/Images/Figuras.pptx
@@ -7,6 +7,7 @@
   <p:sldIdLst>
     <p:sldId id="256" r:id="rId2"/>
     <p:sldId id="257" r:id="rId3"/>
+    <p:sldId id="258" r:id="rId4"/>
   </p:sldIdLst>
   <p:sldSz cx="12192000" cy="6858000"/>
   <p:notesSz cx="6858000" cy="9144000"/>
@@ -3398,13 +3399,8 @@
             </a:r>
             <a:r>
               <a:rPr lang="pt-BR" b="1" dirty="0" smtClean="0"/>
-              <a:t>R </a:t>
-            </a:r>
-            <a:r>
-              <a:rPr lang="pt-BR" b="1" dirty="0" smtClean="0"/>
-              <a:t>do</a:t>
-            </a:r>
-            <a:endParaRPr lang="pt-BR" b="1" dirty="0" smtClean="0"/>
+              <a:t>R do</a:t>
+            </a:r>
           </a:p>
           <a:p>
             <a:pPr algn="ctr"/>
@@ -3658,11 +3654,7 @@
             </a:r>
             <a:r>
               <a:rPr lang="pt-BR" b="1" dirty="0" smtClean="0"/>
-              <a:t>o </a:t>
-            </a:r>
-            <a:r>
-              <a:rPr lang="pt-BR" b="1" dirty="0" smtClean="0"/>
-              <a:t>Ajuste</a:t>
+              <a:t>o Ajuste</a:t>
             </a:r>
           </a:p>
           <a:p>
@@ -4189,11 +4181,7 @@
           <a:p>
             <a:r>
               <a:rPr lang="pt-BR" dirty="0" smtClean="0"/>
-              <a:t>Cadeia de medidas proposta – </a:t>
-            </a:r>
-            <a:r>
-              <a:rPr lang="pt-BR" dirty="0" smtClean="0"/>
-              <a:t>Termômetro</a:t>
+              <a:t>Cadeia de medidas proposta – Termômetro</a:t>
             </a:r>
             <a:endParaRPr lang="pt-BR" dirty="0"/>
           </a:p>
@@ -6266,6 +6254,36 @@
 </p:sld>
 </file>
 
+<file path=ppt/slides/slide3.xml><?xml version="1.0" encoding="utf-8"?>
+<p:sld xmlns:a="http://schemas.openxmlformats.org/drawingml/2006/main" xmlns:r="http://schemas.openxmlformats.org/officeDocument/2006/relationships" xmlns:p="http://schemas.openxmlformats.org/presentationml/2006/main">
+  <p:cSld>
+    <p:spTree>
+      <p:nvGrpSpPr>
+        <p:cNvPr id="1" name=""/>
+        <p:cNvGrpSpPr/>
+        <p:nvPr/>
+      </p:nvGrpSpPr>
+      <p:grpSpPr>
+        <a:xfrm>
+          <a:off x="0" y="0"/>
+          <a:ext cx="0" cy="0"/>
+          <a:chOff x="0" y="0"/>
+          <a:chExt cx="0" cy="0"/>
+        </a:xfrm>
+      </p:grpSpPr>
+    </p:spTree>
+    <p:extLst>
+      <p:ext uri="{BB962C8B-B14F-4D97-AF65-F5344CB8AC3E}">
+        <p14:creationId xmlns:p14="http://schemas.microsoft.com/office/powerpoint/2010/main" val="2920437492"/>
+      </p:ext>
+    </p:extLst>
+  </p:cSld>
+  <p:clrMapOvr>
+    <a:masterClrMapping/>
+  </p:clrMapOvr>
+</p:sld>
+</file>
+
 <file path=ppt/theme/theme1.xml><?xml version="1.0" encoding="utf-8"?>
 <a:theme xmlns:a="http://schemas.openxmlformats.org/drawingml/2006/main" name="Tema do Office">
   <a:themeElements>

</xml_diff>

<commit_message>
Metod Term ok Anem 90%
</commit_message>
<xml_diff>
--- a/Resources/Images/Figuras.pptx
+++ b/Resources/Images/Figuras.pptx
@@ -288,7 +288,7 @@
           <a:p>
             <a:fld id="{637E9AFB-B08B-4167-BD8F-E796937CD375}" type="datetimeFigureOut">
               <a:rPr lang="pt-BR" smtClean="0"/>
-              <a:t>25/06/2016</a:t>
+              <a:t>26/06/2016</a:t>
             </a:fld>
             <a:endParaRPr lang="pt-BR"/>
           </a:p>
@@ -458,7 +458,7 @@
           <a:p>
             <a:fld id="{637E9AFB-B08B-4167-BD8F-E796937CD375}" type="datetimeFigureOut">
               <a:rPr lang="pt-BR" smtClean="0"/>
-              <a:t>25/06/2016</a:t>
+              <a:t>26/06/2016</a:t>
             </a:fld>
             <a:endParaRPr lang="pt-BR"/>
           </a:p>
@@ -638,7 +638,7 @@
           <a:p>
             <a:fld id="{637E9AFB-B08B-4167-BD8F-E796937CD375}" type="datetimeFigureOut">
               <a:rPr lang="pt-BR" smtClean="0"/>
-              <a:t>25/06/2016</a:t>
+              <a:t>26/06/2016</a:t>
             </a:fld>
             <a:endParaRPr lang="pt-BR"/>
           </a:p>
@@ -808,7 +808,7 @@
           <a:p>
             <a:fld id="{637E9AFB-B08B-4167-BD8F-E796937CD375}" type="datetimeFigureOut">
               <a:rPr lang="pt-BR" smtClean="0"/>
-              <a:t>25/06/2016</a:t>
+              <a:t>26/06/2016</a:t>
             </a:fld>
             <a:endParaRPr lang="pt-BR"/>
           </a:p>
@@ -1054,7 +1054,7 @@
           <a:p>
             <a:fld id="{637E9AFB-B08B-4167-BD8F-E796937CD375}" type="datetimeFigureOut">
               <a:rPr lang="pt-BR" smtClean="0"/>
-              <a:t>25/06/2016</a:t>
+              <a:t>26/06/2016</a:t>
             </a:fld>
             <a:endParaRPr lang="pt-BR"/>
           </a:p>
@@ -1286,7 +1286,7 @@
           <a:p>
             <a:fld id="{637E9AFB-B08B-4167-BD8F-E796937CD375}" type="datetimeFigureOut">
               <a:rPr lang="pt-BR" smtClean="0"/>
-              <a:t>25/06/2016</a:t>
+              <a:t>26/06/2016</a:t>
             </a:fld>
             <a:endParaRPr lang="pt-BR"/>
           </a:p>
@@ -1653,7 +1653,7 @@
           <a:p>
             <a:fld id="{637E9AFB-B08B-4167-BD8F-E796937CD375}" type="datetimeFigureOut">
               <a:rPr lang="pt-BR" smtClean="0"/>
-              <a:t>25/06/2016</a:t>
+              <a:t>26/06/2016</a:t>
             </a:fld>
             <a:endParaRPr lang="pt-BR"/>
           </a:p>
@@ -1771,7 +1771,7 @@
           <a:p>
             <a:fld id="{637E9AFB-B08B-4167-BD8F-E796937CD375}" type="datetimeFigureOut">
               <a:rPr lang="pt-BR" smtClean="0"/>
-              <a:t>25/06/2016</a:t>
+              <a:t>26/06/2016</a:t>
             </a:fld>
             <a:endParaRPr lang="pt-BR"/>
           </a:p>
@@ -1866,7 +1866,7 @@
           <a:p>
             <a:fld id="{637E9AFB-B08B-4167-BD8F-E796937CD375}" type="datetimeFigureOut">
               <a:rPr lang="pt-BR" smtClean="0"/>
-              <a:t>25/06/2016</a:t>
+              <a:t>26/06/2016</a:t>
             </a:fld>
             <a:endParaRPr lang="pt-BR"/>
           </a:p>
@@ -2143,7 +2143,7 @@
           <a:p>
             <a:fld id="{637E9AFB-B08B-4167-BD8F-E796937CD375}" type="datetimeFigureOut">
               <a:rPr lang="pt-BR" smtClean="0"/>
-              <a:t>25/06/2016</a:t>
+              <a:t>26/06/2016</a:t>
             </a:fld>
             <a:endParaRPr lang="pt-BR"/>
           </a:p>
@@ -2396,7 +2396,7 @@
           <a:p>
             <a:fld id="{637E9AFB-B08B-4167-BD8F-E796937CD375}" type="datetimeFigureOut">
               <a:rPr lang="pt-BR" smtClean="0"/>
-              <a:t>25/06/2016</a:t>
+              <a:t>26/06/2016</a:t>
             </a:fld>
             <a:endParaRPr lang="pt-BR"/>
           </a:p>
@@ -2609,7 +2609,7 @@
           <a:p>
             <a:fld id="{637E9AFB-B08B-4167-BD8F-E796937CD375}" type="datetimeFigureOut">
               <a:rPr lang="pt-BR" smtClean="0"/>
-              <a:t>25/06/2016</a:t>
+              <a:t>26/06/2016</a:t>
             </a:fld>
             <a:endParaRPr lang="pt-BR"/>
           </a:p>
@@ -4549,11 +4549,7 @@
             <a:pPr algn="ctr"/>
             <a:r>
               <a:rPr lang="pt-BR" b="1" dirty="0" smtClean="0"/>
-              <a:t>-5V </a:t>
-            </a:r>
-            <a:r>
-              <a:rPr lang="pt-BR" b="1" dirty="0" smtClean="0"/>
-              <a:t>a +5V</a:t>
+              <a:t>-5V a +5V</a:t>
             </a:r>
             <a:endParaRPr lang="pt-BR" b="1" dirty="0"/>
           </a:p>
@@ -4584,7 +4580,7 @@
             <a:pPr algn="ctr"/>
             <a:r>
               <a:rPr lang="pt-BR" sz="1400" dirty="0" smtClean="0"/>
-              <a:t>0h0003</a:t>
+              <a:t>0h1458</a:t>
             </a:r>
             <a:endParaRPr lang="pt-BR" sz="1400" dirty="0"/>
           </a:p>
@@ -4615,7 +4611,7 @@
             <a:pPr algn="ctr"/>
             <a:r>
               <a:rPr lang="pt-BR" sz="1400" dirty="0" smtClean="0"/>
-              <a:t>0h3328</a:t>
+              <a:t>0h2984</a:t>
             </a:r>
             <a:endParaRPr lang="pt-BR" sz="1400" dirty="0"/>
           </a:p>
@@ -7816,11 +7812,7 @@
           <a:p>
             <a:r>
               <a:rPr lang="pt-BR" dirty="0" smtClean="0"/>
-              <a:t>Inv</a:t>
-            </a:r>
-            <a:r>
-              <a:rPr lang="pt-BR" dirty="0" smtClean="0"/>
-              <a:t>ólucro metálico</a:t>
+              <a:t>Invólucro metálico</a:t>
             </a:r>
             <a:endParaRPr lang="pt-BR" dirty="0"/>
           </a:p>
@@ -9863,11 +9855,7 @@
           <a:p>
             <a:r>
               <a:rPr lang="pt-BR" dirty="0" smtClean="0"/>
-              <a:t>Cadeia de medidas proposta – </a:t>
-            </a:r>
-            <a:r>
-              <a:rPr lang="pt-BR" dirty="0" smtClean="0"/>
-              <a:t>Sensor de Nível</a:t>
+              <a:t>Cadeia de medidas proposta – Sensor de Nível</a:t>
             </a:r>
             <a:endParaRPr lang="pt-BR" dirty="0"/>
           </a:p>

</xml_diff>

<commit_message>
Metodologia Termometro e Anemometro 100%
</commit_message>
<xml_diff>
--- a/Resources/Images/Figuras.pptx
+++ b/Resources/Images/Figuras.pptx
@@ -10,6 +10,7 @@
     <p:sldId id="258" r:id="rId4"/>
     <p:sldId id="259" r:id="rId5"/>
     <p:sldId id="260" r:id="rId6"/>
+    <p:sldId id="261" r:id="rId7"/>
   </p:sldIdLst>
   <p:sldSz cx="12192000" cy="6858000"/>
   <p:notesSz cx="6858000" cy="9144000"/>
@@ -9018,8 +9019,8 @@
         </p:nvSpPr>
         <p:spPr>
           <a:xfrm>
-            <a:off x="1154374" y="2713502"/>
-            <a:ext cx="431528" cy="369332"/>
+            <a:off x="1058739" y="2713502"/>
+            <a:ext cx="622799" cy="369332"/>
           </a:xfrm>
           <a:prstGeom prst="rect">
             <a:avLst/>
@@ -9032,13 +9033,14 @@
           </a:bodyPr>
           <a:lstStyle/>
           <a:p>
+            <a:pPr algn="ctr"/>
             <a:r>
               <a:rPr lang="el-GR" b="1" dirty="0" smtClean="0"/>
               <a:t>Δ</a:t>
             </a:r>
             <a:r>
-              <a:rPr lang="pt-BR" b="1" dirty="0" smtClean="0"/>
-              <a:t>T</a:t>
+              <a:rPr lang="pt-BR" b="1" dirty="0" err="1" smtClean="0"/>
+              <a:t>Vol</a:t>
             </a:r>
             <a:endParaRPr lang="pt-BR" b="1" dirty="0"/>
           </a:p>
@@ -9052,8 +9054,8 @@
         </p:nvSpPr>
         <p:spPr>
           <a:xfrm>
-            <a:off x="2741544" y="2524295"/>
-            <a:ext cx="747319" cy="646331"/>
+            <a:off x="2700667" y="2524295"/>
+            <a:ext cx="829074" cy="646331"/>
           </a:xfrm>
           <a:prstGeom prst="rect">
             <a:avLst/>
@@ -9073,14 +9075,18 @@
             </a:r>
             <a:r>
               <a:rPr lang="pt-BR" b="1" dirty="0" smtClean="0"/>
-              <a:t>R do</a:t>
+              <a:t>C </a:t>
+            </a:r>
+            <a:r>
+              <a:rPr lang="pt-BR" b="1" dirty="0" smtClean="0"/>
+              <a:t>do</a:t>
             </a:r>
           </a:p>
           <a:p>
             <a:pPr algn="ctr"/>
             <a:r>
               <a:rPr lang="pt-BR" b="1" dirty="0" smtClean="0"/>
-              <a:t>Pt100</a:t>
+              <a:t>Sensor</a:t>
             </a:r>
             <a:endParaRPr lang="pt-BR" b="1" dirty="0"/>
           </a:p>
@@ -9094,8 +9100,8 @@
         </p:nvSpPr>
         <p:spPr>
           <a:xfrm>
-            <a:off x="4353276" y="2384595"/>
-            <a:ext cx="1054456" cy="923330"/>
+            <a:off x="4189451" y="2517945"/>
+            <a:ext cx="1382110" cy="646331"/>
           </a:xfrm>
           <a:prstGeom prst="rect">
             <a:avLst/>
@@ -9111,29 +9117,14 @@
             <a:pPr algn="ctr"/>
             <a:r>
               <a:rPr lang="pt-BR" b="1" dirty="0" smtClean="0"/>
-              <a:t>Tensão</a:t>
+              <a:t>Período</a:t>
             </a:r>
           </a:p>
           <a:p>
             <a:pPr algn="ctr"/>
             <a:r>
-              <a:rPr lang="pt-BR" b="1" dirty="0"/>
-              <a:t>d</a:t>
-            </a:r>
-            <a:r>
               <a:rPr lang="pt-BR" b="1" dirty="0" smtClean="0"/>
-              <a:t>e Saída</a:t>
-            </a:r>
-          </a:p>
-          <a:p>
-            <a:pPr algn="ctr"/>
-            <a:r>
-              <a:rPr lang="pt-BR" b="1" dirty="0"/>
-              <a:t>d</a:t>
-            </a:r>
-            <a:r>
-              <a:rPr lang="pt-BR" b="1" dirty="0" smtClean="0"/>
-              <a:t>a Ponte</a:t>
+              <a:t>do Oscilador</a:t>
             </a:r>
             <a:endParaRPr lang="pt-BR" b="1" dirty="0"/>
           </a:p>
@@ -9289,8 +9280,8 @@
         </p:nvSpPr>
         <p:spPr>
           <a:xfrm>
-            <a:off x="6038213" y="2219495"/>
-            <a:ext cx="1088182" cy="1200329"/>
+            <a:off x="5825304" y="2501882"/>
+            <a:ext cx="1514005" cy="646331"/>
           </a:xfrm>
           <a:prstGeom prst="rect">
             <a:avLst/>
@@ -9306,36 +9297,14 @@
             <a:pPr algn="ctr"/>
             <a:r>
               <a:rPr lang="pt-BR" b="1" dirty="0" smtClean="0"/>
-              <a:t>Tensão</a:t>
+              <a:t>Índice</a:t>
             </a:r>
           </a:p>
           <a:p>
             <a:pPr algn="ctr"/>
             <a:r>
-              <a:rPr lang="pt-BR" b="1" dirty="0"/>
-              <a:t>d</a:t>
-            </a:r>
-            <a:r>
               <a:rPr lang="pt-BR" b="1" dirty="0" smtClean="0"/>
-              <a:t>e Saída</a:t>
-            </a:r>
-          </a:p>
-          <a:p>
-            <a:pPr algn="ctr"/>
-            <a:r>
-              <a:rPr lang="pt-BR" b="1" dirty="0"/>
-              <a:t>d</a:t>
-            </a:r>
-            <a:r>
-              <a:rPr lang="pt-BR" b="1" dirty="0" smtClean="0"/>
-              <a:t>o Ajuste</a:t>
-            </a:r>
-          </a:p>
-          <a:p>
-            <a:pPr algn="ctr"/>
-            <a:r>
-              <a:rPr lang="pt-BR" b="1" dirty="0" smtClean="0"/>
-              <a:t>de Offset</a:t>
+              <a:t>Pluviométrico</a:t>
             </a:r>
             <a:endParaRPr lang="pt-BR" b="1" dirty="0"/>
           </a:p>
@@ -9349,7 +9318,7 @@
         </p:nvCxnSpPr>
         <p:spPr>
           <a:xfrm rot="-1800000">
-            <a:off x="7061463" y="1044064"/>
+            <a:off x="9215121" y="1073059"/>
             <a:ext cx="825500" cy="0"/>
           </a:xfrm>
           <a:prstGeom prst="line">
@@ -9385,7 +9354,7 @@
         </p:nvCxnSpPr>
         <p:spPr>
           <a:xfrm>
-            <a:off x="7831665" y="837689"/>
+            <a:off x="9985323" y="866684"/>
             <a:ext cx="1028700" cy="0"/>
           </a:xfrm>
           <a:prstGeom prst="line">
@@ -9420,7 +9389,7 @@
         </p:nvCxnSpPr>
         <p:spPr>
           <a:xfrm rot="1800000">
-            <a:off x="7061463" y="4664076"/>
+            <a:off x="9215121" y="4693071"/>
             <a:ext cx="825500" cy="0"/>
           </a:xfrm>
           <a:prstGeom prst="line">
@@ -9456,7 +9425,7 @@
         </p:nvCxnSpPr>
         <p:spPr>
           <a:xfrm>
-            <a:off x="7831665" y="4864101"/>
+            <a:off x="9985323" y="4893096"/>
             <a:ext cx="1028700" cy="0"/>
           </a:xfrm>
           <a:prstGeom prst="line">
@@ -9491,8 +9460,8 @@
         </p:nvSpPr>
         <p:spPr>
           <a:xfrm>
-            <a:off x="1090513" y="3190874"/>
-            <a:ext cx="529312" cy="369332"/>
+            <a:off x="1014313" y="3190874"/>
+            <a:ext cx="720005" cy="369332"/>
           </a:xfrm>
           <a:prstGeom prst="rect">
             <a:avLst/>
@@ -9507,7 +9476,7 @@
           <a:p>
             <a:r>
               <a:rPr lang="pt-BR" dirty="0" err="1" smtClean="0"/>
-              <a:t>T</a:t>
+              <a:t>Vol</a:t>
             </a:r>
             <a:r>
               <a:rPr lang="pt-BR" baseline="-25000" dirty="0" err="1" smtClean="0"/>
@@ -9525,8 +9494,8 @@
         </p:nvSpPr>
         <p:spPr>
           <a:xfrm>
-            <a:off x="1090513" y="2124074"/>
-            <a:ext cx="553549" cy="369332"/>
+            <a:off x="1014313" y="2124074"/>
+            <a:ext cx="744243" cy="369332"/>
           </a:xfrm>
           <a:prstGeom prst="rect">
             <a:avLst/>
@@ -9541,7 +9510,7 @@
           <a:p>
             <a:r>
               <a:rPr lang="pt-BR" dirty="0" err="1" smtClean="0"/>
-              <a:t>T</a:t>
+              <a:t>Vol</a:t>
             </a:r>
             <a:r>
               <a:rPr lang="pt-BR" baseline="-25000" dirty="0" err="1" smtClean="0"/>
@@ -9576,7 +9545,7 @@
             <a:pPr algn="ctr"/>
             <a:r>
               <a:rPr lang="pt-BR" dirty="0" err="1" smtClean="0"/>
-              <a:t>R</a:t>
+              <a:t>C</a:t>
             </a:r>
             <a:r>
               <a:rPr lang="pt-BR" baseline="-25000" dirty="0" err="1" smtClean="0"/>
@@ -9611,7 +9580,7 @@
             <a:pPr algn="ctr"/>
             <a:r>
               <a:rPr lang="pt-BR" dirty="0" err="1" smtClean="0"/>
-              <a:t>R</a:t>
+              <a:t>C</a:t>
             </a:r>
             <a:r>
               <a:rPr lang="pt-BR" baseline="-25000" dirty="0" err="1" smtClean="0"/>
@@ -9629,8 +9598,8 @@
         </p:nvSpPr>
         <p:spPr>
           <a:xfrm>
-            <a:off x="4317114" y="1271886"/>
-            <a:ext cx="1126783" cy="369332"/>
+            <a:off x="4600525" y="1271886"/>
+            <a:ext cx="559961" cy="369332"/>
           </a:xfrm>
           <a:prstGeom prst="rect">
             <a:avLst/>
@@ -9646,7 +9615,7 @@
             <a:pPr algn="ctr"/>
             <a:r>
               <a:rPr lang="pt-BR" dirty="0" err="1" smtClean="0"/>
-              <a:t>Vponte</a:t>
+              <a:t>T</a:t>
             </a:r>
             <a:r>
               <a:rPr lang="pt-BR" baseline="-25000" dirty="0" err="1" smtClean="0"/>
@@ -9664,8 +9633,8 @@
         </p:nvSpPr>
         <p:spPr>
           <a:xfrm>
-            <a:off x="4329232" y="4027786"/>
-            <a:ext cx="1102546" cy="369332"/>
+            <a:off x="4619792" y="4027786"/>
+            <a:ext cx="521425" cy="369332"/>
           </a:xfrm>
           <a:prstGeom prst="rect">
             <a:avLst/>
@@ -9681,7 +9650,7 @@
             <a:pPr algn="ctr"/>
             <a:r>
               <a:rPr lang="pt-BR" dirty="0" err="1" smtClean="0"/>
-              <a:t>Vponte</a:t>
+              <a:t>T</a:t>
             </a:r>
             <a:r>
               <a:rPr lang="pt-BR" baseline="-25000" dirty="0" err="1" smtClean="0"/>
@@ -9699,8 +9668,8 @@
         </p:nvSpPr>
         <p:spPr>
           <a:xfrm>
-            <a:off x="6030860" y="884539"/>
-            <a:ext cx="1190390" cy="369332"/>
+            <a:off x="6203407" y="884539"/>
+            <a:ext cx="845296" cy="369332"/>
           </a:xfrm>
           <a:prstGeom prst="rect">
             <a:avLst/>
@@ -9716,11 +9685,11 @@
             <a:pPr algn="ctr"/>
             <a:r>
               <a:rPr lang="pt-BR" dirty="0" err="1" smtClean="0"/>
-              <a:t>V</a:t>
+              <a:t>Pluv</a:t>
             </a:r>
             <a:r>
               <a:rPr lang="pt-BR" baseline="-25000" dirty="0" err="1" smtClean="0"/>
-              <a:t>aj_offset_máx</a:t>
+              <a:t>máx</a:t>
             </a:r>
             <a:endParaRPr lang="pt-BR" dirty="0"/>
           </a:p>
@@ -9734,8 +9703,8 @@
         </p:nvSpPr>
         <p:spPr>
           <a:xfrm>
-            <a:off x="6042979" y="4453239"/>
-            <a:ext cx="1166153" cy="369332"/>
+            <a:off x="6215526" y="4453239"/>
+            <a:ext cx="821059" cy="369332"/>
           </a:xfrm>
           <a:prstGeom prst="rect">
             <a:avLst/>
@@ -9751,11 +9720,11 @@
             <a:pPr algn="ctr"/>
             <a:r>
               <a:rPr lang="pt-BR" dirty="0" err="1" smtClean="0"/>
-              <a:t>V</a:t>
+              <a:t>Pluv</a:t>
             </a:r>
             <a:r>
               <a:rPr lang="pt-BR" baseline="-25000" dirty="0" err="1" smtClean="0"/>
-              <a:t>aj_offset_mín</a:t>
+              <a:t>mín</a:t>
             </a:r>
             <a:endParaRPr lang="pt-BR" dirty="0"/>
           </a:p>
@@ -9769,7 +9738,7 @@
         </p:nvSpPr>
         <p:spPr>
           <a:xfrm>
-            <a:off x="7904132" y="442447"/>
+            <a:off x="10057790" y="471442"/>
             <a:ext cx="883768" cy="369332"/>
           </a:xfrm>
           <a:prstGeom prst="rect">
@@ -9804,7 +9773,7 @@
         </p:nvSpPr>
         <p:spPr>
           <a:xfrm>
-            <a:off x="7916250" y="4836647"/>
+            <a:off x="10069908" y="4865642"/>
             <a:ext cx="859530" cy="369332"/>
           </a:xfrm>
           <a:prstGeom prst="rect">
@@ -9839,7 +9808,7 @@
         </p:nvSpPr>
         <p:spPr>
           <a:xfrm>
-            <a:off x="1225755" y="5997408"/>
+            <a:off x="1929922" y="4826446"/>
             <a:ext cx="4519058" cy="369332"/>
           </a:xfrm>
           <a:prstGeom prst="rect">
@@ -9869,8 +9838,8 @@
         </p:nvSpPr>
         <p:spPr>
           <a:xfrm>
-            <a:off x="1072056" y="2985134"/>
-            <a:ext cx="590225" cy="307777"/>
+            <a:off x="1120146" y="2985134"/>
+            <a:ext cx="494046" cy="307777"/>
           </a:xfrm>
           <a:prstGeom prst="rect">
             <a:avLst/>
@@ -9886,13 +9855,7 @@
             <a:pPr algn="ctr"/>
             <a:r>
               <a:rPr lang="pt-BR" sz="1400" dirty="0" smtClean="0"/>
-              <a:t>-10</a:t>
-            </a:r>
-            <a:r>
-              <a:rPr lang="pt-BR" sz="1400" dirty="0" smtClean="0">
-                <a:cs typeface="Times New Roman" panose="02020603050405020304" pitchFamily="18" charset="0"/>
-              </a:rPr>
-              <a:t>°C</a:t>
+              <a:t>0mL</a:t>
             </a:r>
             <a:endParaRPr lang="pt-BR" sz="1400" dirty="0"/>
           </a:p>
@@ -9906,8 +9869,8 @@
         </p:nvSpPr>
         <p:spPr>
           <a:xfrm>
-            <a:off x="1099306" y="2444114"/>
-            <a:ext cx="535723" cy="307777"/>
+            <a:off x="1028773" y="2444114"/>
+            <a:ext cx="676788" cy="307777"/>
           </a:xfrm>
           <a:prstGeom prst="rect">
             <a:avLst/>
@@ -9923,13 +9886,7 @@
             <a:pPr algn="ctr"/>
             <a:r>
               <a:rPr lang="pt-BR" sz="1400" dirty="0" smtClean="0"/>
-              <a:t>50</a:t>
-            </a:r>
-            <a:r>
-              <a:rPr lang="pt-BR" sz="1400" dirty="0" smtClean="0">
-                <a:cs typeface="Times New Roman" panose="02020603050405020304" pitchFamily="18" charset="0"/>
-              </a:rPr>
-              <a:t>°C</a:t>
+              <a:t>120mL</a:t>
             </a:r>
             <a:endParaRPr lang="pt-BR" sz="1400" dirty="0"/>
           </a:p>
@@ -9943,8 +9900,8 @@
         </p:nvSpPr>
         <p:spPr>
           <a:xfrm>
-            <a:off x="2758376" y="2026177"/>
-            <a:ext cx="713658" cy="307777"/>
+            <a:off x="2795246" y="2026177"/>
+            <a:ext cx="639919" cy="307777"/>
           </a:xfrm>
           <a:prstGeom prst="rect">
             <a:avLst/>
@@ -9959,12 +9916,8 @@
           <a:p>
             <a:pPr algn="ctr"/>
             <a:r>
-              <a:rPr lang="pt-BR" sz="1400" dirty="0" smtClean="0"/>
-              <a:t>119.4</a:t>
-            </a:r>
-            <a:r>
-              <a:rPr lang="el-GR" sz="1400" dirty="0" smtClean="0"/>
-              <a:t>Ω</a:t>
+              <a:rPr lang="pt-BR" sz="1400" dirty="0" err="1" smtClean="0"/>
+              <a:t>XXXpF</a:t>
             </a:r>
             <a:endParaRPr lang="pt-BR" sz="1400" dirty="0"/>
           </a:p>
@@ -9978,8 +9931,8 @@
         </p:nvSpPr>
         <p:spPr>
           <a:xfrm>
-            <a:off x="2804062" y="3397777"/>
-            <a:ext cx="622286" cy="307777"/>
+            <a:off x="2795246" y="3397777"/>
+            <a:ext cx="639920" cy="307777"/>
           </a:xfrm>
           <a:prstGeom prst="rect">
             <a:avLst/>
@@ -9994,12 +9947,12 @@
           <a:p>
             <a:pPr algn="ctr"/>
             <a:r>
-              <a:rPr lang="pt-BR" sz="1400" dirty="0" smtClean="0"/>
-              <a:t>96.1</a:t>
-            </a:r>
-            <a:r>
-              <a:rPr lang="el-GR" sz="1400" dirty="0" smtClean="0"/>
-              <a:t>Ω</a:t>
+              <a:rPr lang="pt-BR" sz="1400" dirty="0" err="1" smtClean="0"/>
+              <a:t>XXX</a:t>
+            </a:r>
+            <a:r>
+              <a:rPr lang="pt-BR" sz="1400" dirty="0" err="1" smtClean="0"/>
+              <a:t>pF</a:t>
             </a:r>
             <a:endParaRPr lang="pt-BR" sz="1400" dirty="0"/>
           </a:p>
@@ -10013,8 +9966,8 @@
         </p:nvSpPr>
         <p:spPr>
           <a:xfrm>
-            <a:off x="4478793" y="3791566"/>
-            <a:ext cx="803425" cy="307777"/>
+            <a:off x="4613445" y="3791566"/>
+            <a:ext cx="534121" cy="307777"/>
           </a:xfrm>
           <a:prstGeom prst="rect">
             <a:avLst/>
@@ -10029,10 +9982,14 @@
           <a:p>
             <a:pPr algn="ctr"/>
             <a:r>
-              <a:rPr lang="pt-BR" sz="1400" dirty="0" smtClean="0"/>
-              <a:t>-49.7mV</a:t>
-            </a:r>
-            <a:endParaRPr lang="pt-BR" sz="1400" dirty="0"/>
+              <a:rPr lang="pt-BR" sz="1400" dirty="0" err="1" smtClean="0"/>
+              <a:t>XXX</a:t>
+            </a:r>
+            <a:r>
+              <a:rPr lang="pt-BR" sz="1400" i="1" dirty="0" err="1" smtClean="0"/>
+              <a:t>s</a:t>
+            </a:r>
+            <a:endParaRPr lang="pt-BR" sz="1400" i="1" dirty="0"/>
           </a:p>
         </p:txBody>
       </p:sp>
@@ -10044,8 +10001,8 @@
         </p:nvSpPr>
         <p:spPr>
           <a:xfrm>
-            <a:off x="4460358" y="1619866"/>
-            <a:ext cx="840295" cy="307777"/>
+            <a:off x="4613445" y="1619866"/>
+            <a:ext cx="534121" cy="307777"/>
           </a:xfrm>
           <a:prstGeom prst="rect">
             <a:avLst/>
@@ -10060,10 +10017,14 @@
           <a:p>
             <a:pPr algn="ctr"/>
             <a:r>
-              <a:rPr lang="pt-BR" sz="1400" dirty="0" smtClean="0"/>
-              <a:t>221.1mV</a:t>
-            </a:r>
-            <a:endParaRPr lang="pt-BR" sz="1400" dirty="0"/>
+              <a:rPr lang="pt-BR" sz="1400" dirty="0" err="1" smtClean="0"/>
+              <a:t>XXX</a:t>
+            </a:r>
+            <a:r>
+              <a:rPr lang="pt-BR" sz="1400" i="1" dirty="0" err="1" smtClean="0"/>
+              <a:t>s</a:t>
+            </a:r>
+            <a:endParaRPr lang="pt-BR" sz="1400" i="1" dirty="0"/>
           </a:p>
         </p:txBody>
       </p:sp>
@@ -10075,8 +10036,8 @@
         </p:nvSpPr>
         <p:spPr>
           <a:xfrm>
-            <a:off x="6205907" y="1212199"/>
-            <a:ext cx="840294" cy="307777"/>
+            <a:off x="6345368" y="1212199"/>
+            <a:ext cx="561372" cy="307777"/>
           </a:xfrm>
           <a:prstGeom prst="rect">
             <a:avLst/>
@@ -10092,7 +10053,7 @@
             <a:pPr algn="ctr"/>
             <a:r>
               <a:rPr lang="pt-BR" sz="1400" dirty="0" smtClean="0"/>
-              <a:t>270.8mV</a:t>
+              <a:t>8mm</a:t>
             </a:r>
             <a:endParaRPr lang="pt-BR" sz="1400" dirty="0"/>
           </a:p>
@@ -10106,8 +10067,8 @@
         </p:nvSpPr>
         <p:spPr>
           <a:xfrm>
-            <a:off x="6341361" y="4178919"/>
-            <a:ext cx="569387" cy="307777"/>
+            <a:off x="6345368" y="4178919"/>
+            <a:ext cx="561372" cy="307777"/>
           </a:xfrm>
           <a:prstGeom prst="rect">
             <a:avLst/>
@@ -10123,7 +10084,7 @@
             <a:pPr algn="ctr"/>
             <a:r>
               <a:rPr lang="pt-BR" sz="1400" dirty="0" smtClean="0"/>
-              <a:t>73µV</a:t>
+              <a:t>0mm</a:t>
             </a:r>
             <a:endParaRPr lang="pt-BR" sz="1400" dirty="0"/>
           </a:p>
@@ -10137,7 +10098,7 @@
         </p:nvCxnSpPr>
         <p:spPr>
           <a:xfrm rot="-1800000">
-            <a:off x="8805067" y="631314"/>
+            <a:off x="10958725" y="660309"/>
             <a:ext cx="825500" cy="0"/>
           </a:xfrm>
           <a:prstGeom prst="line">
@@ -10173,7 +10134,7 @@
         </p:nvCxnSpPr>
         <p:spPr>
           <a:xfrm>
-            <a:off x="9575269" y="424939"/>
+            <a:off x="11728927" y="453934"/>
             <a:ext cx="1028700" cy="0"/>
           </a:xfrm>
           <a:prstGeom prst="line">
@@ -10208,7 +10169,7 @@
         </p:nvCxnSpPr>
         <p:spPr>
           <a:xfrm rot="1800000">
-            <a:off x="8805067" y="5070477"/>
+            <a:off x="10958725" y="5099472"/>
             <a:ext cx="825500" cy="0"/>
           </a:xfrm>
           <a:prstGeom prst="line">
@@ -10244,7 +10205,7 @@
         </p:nvCxnSpPr>
         <p:spPr>
           <a:xfrm>
-            <a:off x="9575269" y="5270502"/>
+            <a:off x="11728927" y="5299497"/>
             <a:ext cx="1028700" cy="0"/>
           </a:xfrm>
           <a:prstGeom prst="line">
@@ -10279,7 +10240,7 @@
         </p:nvSpPr>
         <p:spPr>
           <a:xfrm>
-            <a:off x="9806529" y="5243048"/>
+            <a:off x="11960187" y="5272043"/>
             <a:ext cx="566181" cy="369332"/>
           </a:xfrm>
           <a:prstGeom prst="rect">
@@ -10314,7 +10275,7 @@
         </p:nvSpPr>
         <p:spPr>
           <a:xfrm>
-            <a:off x="7769421" y="2219495"/>
+            <a:off x="9923079" y="2248490"/>
             <a:ext cx="1283364" cy="1477328"/>
           </a:xfrm>
           <a:prstGeom prst="rect">
@@ -10397,7 +10358,7 @@
         </p:nvSpPr>
         <p:spPr>
           <a:xfrm>
-            <a:off x="8017239" y="4595347"/>
+            <a:off x="10170897" y="4624342"/>
             <a:ext cx="657552" cy="307777"/>
           </a:xfrm>
           <a:prstGeom prst="rect">
@@ -10428,7 +10389,7 @@
         </p:nvSpPr>
         <p:spPr>
           <a:xfrm>
-            <a:off x="7997202" y="798047"/>
+            <a:off x="10150860" y="827042"/>
             <a:ext cx="697627" cy="307777"/>
           </a:xfrm>
           <a:prstGeom prst="rect">
@@ -10459,7 +10420,7 @@
         </p:nvSpPr>
         <p:spPr>
           <a:xfrm>
-            <a:off x="9657451" y="2436503"/>
+            <a:off x="11811109" y="2465498"/>
             <a:ext cx="889987" cy="923330"/>
           </a:xfrm>
           <a:prstGeom prst="rect">
@@ -10504,7 +10465,7 @@
         </p:nvSpPr>
         <p:spPr>
           <a:xfrm>
-            <a:off x="9721570" y="4989048"/>
+            <a:off x="11875228" y="5018043"/>
             <a:ext cx="736100" cy="307777"/>
           </a:xfrm>
           <a:prstGeom prst="rect">
@@ -10535,7 +10496,7 @@
         </p:nvSpPr>
         <p:spPr>
           <a:xfrm>
-            <a:off x="9721570" y="391648"/>
+            <a:off x="11875228" y="420643"/>
             <a:ext cx="736100" cy="307777"/>
           </a:xfrm>
           <a:prstGeom prst="rect">
@@ -10679,7 +10640,7 @@
           <a:p>
             <a:r>
               <a:rPr lang="pt-BR" sz="2800" b="1" dirty="0" smtClean="0"/>
-              <a:t>D=17.84cm</a:t>
+              <a:t>D=13.82cm</a:t>
             </a:r>
             <a:endParaRPr lang="pt-BR" sz="2800" b="1" dirty="0"/>
           </a:p>
@@ -10689,6 +10650,951 @@
     <p:extLst>
       <p:ext uri="{BB962C8B-B14F-4D97-AF65-F5344CB8AC3E}">
         <p14:creationId xmlns:p14="http://schemas.microsoft.com/office/powerpoint/2010/main" val="2941553115"/>
+      </p:ext>
+    </p:extLst>
+  </p:cSld>
+  <p:clrMapOvr>
+    <a:masterClrMapping/>
+  </p:clrMapOvr>
+</p:sld>
+</file>
+
+<file path=ppt/slides/slide6.xml><?xml version="1.0" encoding="utf-8"?>
+<p:sld xmlns:a="http://schemas.openxmlformats.org/drawingml/2006/main" xmlns:r="http://schemas.openxmlformats.org/officeDocument/2006/relationships" xmlns:p="http://schemas.openxmlformats.org/presentationml/2006/main">
+  <p:cSld>
+    <p:spTree>
+      <p:nvGrpSpPr>
+        <p:cNvPr id="1" name=""/>
+        <p:cNvGrpSpPr/>
+        <p:nvPr/>
+      </p:nvGrpSpPr>
+      <p:grpSpPr>
+        <a:xfrm>
+          <a:off x="0" y="0"/>
+          <a:ext cx="0" cy="0"/>
+          <a:chOff x="0" y="0"/>
+          <a:chExt cx="0" cy="0"/>
+        </a:xfrm>
+      </p:grpSpPr>
+      <p:cxnSp>
+        <p:nvCxnSpPr>
+          <p:cNvPr id="4" name="Conector reto 3"/>
+          <p:cNvCxnSpPr/>
+          <p:nvPr/>
+        </p:nvCxnSpPr>
+        <p:spPr>
+          <a:xfrm>
+            <a:off x="857250" y="2495550"/>
+            <a:ext cx="1028700" cy="0"/>
+          </a:xfrm>
+          <a:prstGeom prst="line">
+            <a:avLst/>
+          </a:prstGeom>
+          <a:ln w="19050">
+            <a:solidFill>
+              <a:schemeClr val="tx1"/>
+            </a:solidFill>
+          </a:ln>
+        </p:spPr>
+        <p:style>
+          <a:lnRef idx="1">
+            <a:schemeClr val="accent1"/>
+          </a:lnRef>
+          <a:fillRef idx="0">
+            <a:schemeClr val="accent1"/>
+          </a:fillRef>
+          <a:effectRef idx="0">
+            <a:schemeClr val="accent1"/>
+          </a:effectRef>
+          <a:fontRef idx="minor">
+            <a:schemeClr val="tx1"/>
+          </a:fontRef>
+        </p:style>
+      </p:cxnSp>
+      <p:cxnSp>
+        <p:nvCxnSpPr>
+          <p:cNvPr id="5" name="Conector reto 4"/>
+          <p:cNvCxnSpPr/>
+          <p:nvPr/>
+        </p:nvCxnSpPr>
+        <p:spPr>
+          <a:xfrm>
+            <a:off x="857250" y="3238500"/>
+            <a:ext cx="1028700" cy="0"/>
+          </a:xfrm>
+          <a:prstGeom prst="line">
+            <a:avLst/>
+          </a:prstGeom>
+          <a:ln w="19050">
+            <a:solidFill>
+              <a:schemeClr val="tx1"/>
+            </a:solidFill>
+          </a:ln>
+        </p:spPr>
+        <p:style>
+          <a:lnRef idx="1">
+            <a:schemeClr val="accent1"/>
+          </a:lnRef>
+          <a:fillRef idx="0">
+            <a:schemeClr val="accent1"/>
+          </a:fillRef>
+          <a:effectRef idx="0">
+            <a:schemeClr val="accent1"/>
+          </a:effectRef>
+          <a:fontRef idx="minor">
+            <a:schemeClr val="tx1"/>
+          </a:fontRef>
+        </p:style>
+      </p:cxnSp>
+      <p:cxnSp>
+        <p:nvCxnSpPr>
+          <p:cNvPr id="6" name="Conector reto 5"/>
+          <p:cNvCxnSpPr/>
+          <p:nvPr/>
+        </p:nvCxnSpPr>
+        <p:spPr>
+          <a:xfrm rot="-1800000">
+            <a:off x="1830652" y="2289175"/>
+            <a:ext cx="825500" cy="0"/>
+          </a:xfrm>
+          <a:prstGeom prst="line">
+            <a:avLst/>
+          </a:prstGeom>
+          <a:ln w="28575">
+            <a:solidFill>
+              <a:schemeClr val="tx1"/>
+            </a:solidFill>
+            <a:prstDash val="dash"/>
+          </a:ln>
+        </p:spPr>
+        <p:style>
+          <a:lnRef idx="1">
+            <a:schemeClr val="accent1"/>
+          </a:lnRef>
+          <a:fillRef idx="0">
+            <a:schemeClr val="accent1"/>
+          </a:fillRef>
+          <a:effectRef idx="0">
+            <a:schemeClr val="accent1"/>
+          </a:effectRef>
+          <a:fontRef idx="minor">
+            <a:schemeClr val="tx1"/>
+          </a:fontRef>
+        </p:style>
+      </p:cxnSp>
+      <p:cxnSp>
+        <p:nvCxnSpPr>
+          <p:cNvPr id="7" name="Conector reto 6"/>
+          <p:cNvCxnSpPr/>
+          <p:nvPr/>
+        </p:nvCxnSpPr>
+        <p:spPr>
+          <a:xfrm rot="1800000">
+            <a:off x="1830652" y="3444875"/>
+            <a:ext cx="825500" cy="0"/>
+          </a:xfrm>
+          <a:prstGeom prst="line">
+            <a:avLst/>
+          </a:prstGeom>
+          <a:ln w="28575">
+            <a:solidFill>
+              <a:schemeClr val="tx1"/>
+            </a:solidFill>
+            <a:prstDash val="dash"/>
+          </a:ln>
+        </p:spPr>
+        <p:style>
+          <a:lnRef idx="1">
+            <a:schemeClr val="accent1"/>
+          </a:lnRef>
+          <a:fillRef idx="0">
+            <a:schemeClr val="accent1"/>
+          </a:fillRef>
+          <a:effectRef idx="0">
+            <a:schemeClr val="accent1"/>
+          </a:effectRef>
+          <a:fontRef idx="minor">
+            <a:schemeClr val="tx1"/>
+          </a:fontRef>
+        </p:style>
+      </p:cxnSp>
+      <p:cxnSp>
+        <p:nvCxnSpPr>
+          <p:cNvPr id="8" name="Conector reto 7"/>
+          <p:cNvCxnSpPr/>
+          <p:nvPr/>
+        </p:nvCxnSpPr>
+        <p:spPr>
+          <a:xfrm>
+            <a:off x="2600854" y="2082800"/>
+            <a:ext cx="1028700" cy="0"/>
+          </a:xfrm>
+          <a:prstGeom prst="line">
+            <a:avLst/>
+          </a:prstGeom>
+          <a:ln w="19050">
+            <a:solidFill>
+              <a:schemeClr val="tx1"/>
+            </a:solidFill>
+          </a:ln>
+        </p:spPr>
+        <p:style>
+          <a:lnRef idx="1">
+            <a:schemeClr val="accent1"/>
+          </a:lnRef>
+          <a:fillRef idx="0">
+            <a:schemeClr val="accent1"/>
+          </a:fillRef>
+          <a:effectRef idx="0">
+            <a:schemeClr val="accent1"/>
+          </a:effectRef>
+          <a:fontRef idx="minor">
+            <a:schemeClr val="tx1"/>
+          </a:fontRef>
+        </p:style>
+      </p:cxnSp>
+      <p:cxnSp>
+        <p:nvCxnSpPr>
+          <p:cNvPr id="9" name="Conector reto 8"/>
+          <p:cNvCxnSpPr/>
+          <p:nvPr/>
+        </p:nvCxnSpPr>
+        <p:spPr>
+          <a:xfrm>
+            <a:off x="2600854" y="3644900"/>
+            <a:ext cx="1028700" cy="0"/>
+          </a:xfrm>
+          <a:prstGeom prst="line">
+            <a:avLst/>
+          </a:prstGeom>
+          <a:ln w="19050">
+            <a:solidFill>
+              <a:schemeClr val="tx1"/>
+            </a:solidFill>
+          </a:ln>
+        </p:spPr>
+        <p:style>
+          <a:lnRef idx="1">
+            <a:schemeClr val="accent1"/>
+          </a:lnRef>
+          <a:fillRef idx="0">
+            <a:schemeClr val="accent1"/>
+          </a:fillRef>
+          <a:effectRef idx="0">
+            <a:schemeClr val="accent1"/>
+          </a:effectRef>
+          <a:fontRef idx="minor">
+            <a:schemeClr val="tx1"/>
+          </a:fontRef>
+        </p:style>
+      </p:cxnSp>
+      <p:sp>
+        <p:nvSpPr>
+          <p:cNvPr id="14" name="CaixaDeTexto 13"/>
+          <p:cNvSpPr txBox="1"/>
+          <p:nvPr/>
+        </p:nvSpPr>
+        <p:spPr>
+          <a:xfrm>
+            <a:off x="1006052" y="2686608"/>
+            <a:ext cx="747128" cy="369332"/>
+          </a:xfrm>
+          <a:prstGeom prst="rect">
+            <a:avLst/>
+          </a:prstGeom>
+          <a:noFill/>
+        </p:spPr>
+        <p:txBody>
+          <a:bodyPr wrap="none" rtlCol="0">
+            <a:spAutoFit/>
+          </a:bodyPr>
+          <a:lstStyle/>
+          <a:p>
+            <a:pPr algn="ctr"/>
+            <a:r>
+              <a:rPr lang="pt-BR" b="1" dirty="0" smtClean="0"/>
+              <a:t>Vento</a:t>
+            </a:r>
+            <a:endParaRPr lang="pt-BR" b="1" dirty="0"/>
+          </a:p>
+        </p:txBody>
+      </p:sp>
+      <p:sp>
+        <p:nvSpPr>
+          <p:cNvPr id="15" name="CaixaDeTexto 14"/>
+          <p:cNvSpPr txBox="1"/>
+          <p:nvPr/>
+        </p:nvSpPr>
+        <p:spPr>
+          <a:xfrm>
+            <a:off x="2426363" y="2524295"/>
+            <a:ext cx="1377685" cy="646331"/>
+          </a:xfrm>
+          <a:prstGeom prst="rect">
+            <a:avLst/>
+          </a:prstGeom>
+          <a:noFill/>
+        </p:spPr>
+        <p:txBody>
+          <a:bodyPr wrap="none" rtlCol="0">
+            <a:spAutoFit/>
+          </a:bodyPr>
+          <a:lstStyle/>
+          <a:p>
+            <a:pPr algn="ctr"/>
+            <a:r>
+              <a:rPr lang="pt-BR" b="1" dirty="0" smtClean="0"/>
+              <a:t>Rotações</a:t>
+            </a:r>
+          </a:p>
+          <a:p>
+            <a:pPr algn="ctr"/>
+            <a:r>
+              <a:rPr lang="pt-BR" b="1" dirty="0" smtClean="0"/>
+              <a:t>Da Estrutura</a:t>
+            </a:r>
+            <a:endParaRPr lang="pt-BR" b="1" dirty="0"/>
+          </a:p>
+        </p:txBody>
+      </p:sp>
+      <p:sp>
+        <p:nvSpPr>
+          <p:cNvPr id="27" name="CaixaDeTexto 26"/>
+          <p:cNvSpPr txBox="1"/>
+          <p:nvPr/>
+        </p:nvSpPr>
+        <p:spPr>
+          <a:xfrm>
+            <a:off x="1090513" y="3190874"/>
+            <a:ext cx="549318" cy="369332"/>
+          </a:xfrm>
+          <a:prstGeom prst="rect">
+            <a:avLst/>
+          </a:prstGeom>
+          <a:noFill/>
+        </p:spPr>
+        <p:txBody>
+          <a:bodyPr wrap="none" rtlCol="0">
+            <a:spAutoFit/>
+          </a:bodyPr>
+          <a:lstStyle/>
+          <a:p>
+            <a:r>
+              <a:rPr lang="pt-BR" dirty="0" err="1" smtClean="0"/>
+              <a:t>V</a:t>
+            </a:r>
+            <a:r>
+              <a:rPr lang="pt-BR" baseline="-25000" dirty="0" err="1" smtClean="0"/>
+              <a:t>mín</a:t>
+            </a:r>
+            <a:endParaRPr lang="pt-BR" dirty="0"/>
+          </a:p>
+        </p:txBody>
+      </p:sp>
+      <p:sp>
+        <p:nvSpPr>
+          <p:cNvPr id="28" name="CaixaDeTexto 27"/>
+          <p:cNvSpPr txBox="1"/>
+          <p:nvPr/>
+        </p:nvSpPr>
+        <p:spPr>
+          <a:xfrm>
+            <a:off x="1090513" y="2124074"/>
+            <a:ext cx="573555" cy="369332"/>
+          </a:xfrm>
+          <a:prstGeom prst="rect">
+            <a:avLst/>
+          </a:prstGeom>
+          <a:noFill/>
+        </p:spPr>
+        <p:txBody>
+          <a:bodyPr wrap="none" rtlCol="0">
+            <a:spAutoFit/>
+          </a:bodyPr>
+          <a:lstStyle/>
+          <a:p>
+            <a:r>
+              <a:rPr lang="pt-BR" dirty="0" err="1" smtClean="0"/>
+              <a:t>V</a:t>
+            </a:r>
+            <a:r>
+              <a:rPr lang="pt-BR" baseline="-25000" dirty="0" err="1" smtClean="0"/>
+              <a:t>máx</a:t>
+            </a:r>
+            <a:endParaRPr lang="pt-BR" dirty="0"/>
+          </a:p>
+        </p:txBody>
+      </p:sp>
+      <p:sp>
+        <p:nvSpPr>
+          <p:cNvPr id="29" name="CaixaDeTexto 28"/>
+          <p:cNvSpPr txBox="1"/>
+          <p:nvPr/>
+        </p:nvSpPr>
+        <p:spPr>
+          <a:xfrm>
+            <a:off x="2670916" y="1680689"/>
+            <a:ext cx="888578" cy="369332"/>
+          </a:xfrm>
+          <a:prstGeom prst="rect">
+            <a:avLst/>
+          </a:prstGeom>
+          <a:noFill/>
+        </p:spPr>
+        <p:txBody>
+          <a:bodyPr wrap="none" rtlCol="0">
+            <a:spAutoFit/>
+          </a:bodyPr>
+          <a:lstStyle/>
+          <a:p>
+            <a:pPr algn="ctr"/>
+            <a:r>
+              <a:rPr lang="pt-BR" dirty="0" err="1" smtClean="0"/>
+              <a:t>RPM</a:t>
+            </a:r>
+            <a:r>
+              <a:rPr lang="pt-BR" baseline="-25000" dirty="0" err="1" smtClean="0"/>
+              <a:t>máx</a:t>
+            </a:r>
+            <a:endParaRPr lang="pt-BR" dirty="0"/>
+          </a:p>
+        </p:txBody>
+      </p:sp>
+      <p:sp>
+        <p:nvSpPr>
+          <p:cNvPr id="30" name="CaixaDeTexto 29"/>
+          <p:cNvSpPr txBox="1"/>
+          <p:nvPr/>
+        </p:nvSpPr>
+        <p:spPr>
+          <a:xfrm>
+            <a:off x="2683035" y="3598389"/>
+            <a:ext cx="864340" cy="369332"/>
+          </a:xfrm>
+          <a:prstGeom prst="rect">
+            <a:avLst/>
+          </a:prstGeom>
+          <a:noFill/>
+        </p:spPr>
+        <p:txBody>
+          <a:bodyPr wrap="none" rtlCol="0">
+            <a:spAutoFit/>
+          </a:bodyPr>
+          <a:lstStyle/>
+          <a:p>
+            <a:pPr algn="ctr"/>
+            <a:r>
+              <a:rPr lang="pt-BR" dirty="0" err="1" smtClean="0"/>
+              <a:t>RPM</a:t>
+            </a:r>
+            <a:r>
+              <a:rPr lang="pt-BR" baseline="-25000" dirty="0" err="1" smtClean="0"/>
+              <a:t>mín</a:t>
+            </a:r>
+            <a:endParaRPr lang="pt-BR" dirty="0"/>
+          </a:p>
+        </p:txBody>
+      </p:sp>
+      <p:sp>
+        <p:nvSpPr>
+          <p:cNvPr id="37" name="CaixaDeTexto 36"/>
+          <p:cNvSpPr txBox="1"/>
+          <p:nvPr/>
+        </p:nvSpPr>
+        <p:spPr>
+          <a:xfrm>
+            <a:off x="1225755" y="4606758"/>
+            <a:ext cx="4319196" cy="369332"/>
+          </a:xfrm>
+          <a:prstGeom prst="rect">
+            <a:avLst/>
+          </a:prstGeom>
+          <a:noFill/>
+        </p:spPr>
+        <p:txBody>
+          <a:bodyPr wrap="none" rtlCol="0">
+            <a:spAutoFit/>
+          </a:bodyPr>
+          <a:lstStyle/>
+          <a:p>
+            <a:r>
+              <a:rPr lang="pt-BR" dirty="0" smtClean="0"/>
+              <a:t>Cadeia de medidas proposta – </a:t>
+            </a:r>
+            <a:r>
+              <a:rPr lang="pt-BR" dirty="0" smtClean="0"/>
+              <a:t>Anemômetro</a:t>
+            </a:r>
+            <a:endParaRPr lang="pt-BR" dirty="0"/>
+          </a:p>
+        </p:txBody>
+      </p:sp>
+      <p:sp>
+        <p:nvSpPr>
+          <p:cNvPr id="38" name="CaixaDeTexto 37"/>
+          <p:cNvSpPr txBox="1"/>
+          <p:nvPr/>
+        </p:nvSpPr>
+        <p:spPr>
+          <a:xfrm>
+            <a:off x="1089786" y="2985134"/>
+            <a:ext cx="554767" cy="307777"/>
+          </a:xfrm>
+          <a:prstGeom prst="rect">
+            <a:avLst/>
+          </a:prstGeom>
+          <a:noFill/>
+        </p:spPr>
+        <p:txBody>
+          <a:bodyPr wrap="none" rtlCol="0">
+            <a:spAutoFit/>
+          </a:bodyPr>
+          <a:lstStyle/>
+          <a:p>
+            <a:pPr algn="ctr"/>
+            <a:r>
+              <a:rPr lang="pt-BR" sz="1400" dirty="0" smtClean="0"/>
+              <a:t>3m/s</a:t>
+            </a:r>
+            <a:endParaRPr lang="pt-BR" sz="1400" dirty="0"/>
+          </a:p>
+        </p:txBody>
+      </p:sp>
+      <p:sp>
+        <p:nvSpPr>
+          <p:cNvPr id="39" name="CaixaDeTexto 38"/>
+          <p:cNvSpPr txBox="1"/>
+          <p:nvPr/>
+        </p:nvSpPr>
+        <p:spPr>
+          <a:xfrm>
+            <a:off x="1044098" y="2444114"/>
+            <a:ext cx="646139" cy="307777"/>
+          </a:xfrm>
+          <a:prstGeom prst="rect">
+            <a:avLst/>
+          </a:prstGeom>
+          <a:noFill/>
+        </p:spPr>
+        <p:txBody>
+          <a:bodyPr wrap="none" rtlCol="0">
+            <a:spAutoFit/>
+          </a:bodyPr>
+          <a:lstStyle/>
+          <a:p>
+            <a:pPr algn="ctr"/>
+            <a:r>
+              <a:rPr lang="pt-BR" sz="1400" dirty="0" smtClean="0"/>
+              <a:t>15m/s</a:t>
+            </a:r>
+            <a:endParaRPr lang="pt-BR" sz="1400" dirty="0"/>
+          </a:p>
+        </p:txBody>
+      </p:sp>
+      <p:sp>
+        <p:nvSpPr>
+          <p:cNvPr id="40" name="CaixaDeTexto 39"/>
+          <p:cNvSpPr txBox="1"/>
+          <p:nvPr/>
+        </p:nvSpPr>
+        <p:spPr>
+          <a:xfrm>
+            <a:off x="2693455" y="2026177"/>
+            <a:ext cx="843501" cy="307777"/>
+          </a:xfrm>
+          <a:prstGeom prst="rect">
+            <a:avLst/>
+          </a:prstGeom>
+          <a:noFill/>
+        </p:spPr>
+        <p:txBody>
+          <a:bodyPr wrap="none" rtlCol="0">
+            <a:spAutoFit/>
+          </a:bodyPr>
+          <a:lstStyle/>
+          <a:p>
+            <a:pPr algn="ctr"/>
+            <a:r>
+              <a:rPr lang="pt-BR" sz="1400" dirty="0" smtClean="0"/>
+              <a:t>796 RPM</a:t>
+            </a:r>
+            <a:endParaRPr lang="pt-BR" sz="1400" dirty="0"/>
+          </a:p>
+        </p:txBody>
+      </p:sp>
+      <p:sp>
+        <p:nvSpPr>
+          <p:cNvPr id="41" name="CaixaDeTexto 40"/>
+          <p:cNvSpPr txBox="1"/>
+          <p:nvPr/>
+        </p:nvSpPr>
+        <p:spPr>
+          <a:xfrm>
+            <a:off x="2830512" y="3397777"/>
+            <a:ext cx="569387" cy="954107"/>
+          </a:xfrm>
+          <a:prstGeom prst="rect">
+            <a:avLst/>
+          </a:prstGeom>
+          <a:noFill/>
+        </p:spPr>
+        <p:txBody>
+          <a:bodyPr wrap="none" rtlCol="0">
+            <a:spAutoFit/>
+          </a:bodyPr>
+          <a:lstStyle/>
+          <a:p>
+            <a:pPr algn="ctr"/>
+            <a:r>
+              <a:rPr lang="pt-BR" sz="1400" dirty="0" smtClean="0"/>
+              <a:t>159</a:t>
+            </a:r>
+          </a:p>
+          <a:p>
+            <a:pPr algn="ctr"/>
+            <a:endParaRPr lang="pt-BR" sz="1400" dirty="0"/>
+          </a:p>
+          <a:p>
+            <a:pPr algn="ctr"/>
+            <a:endParaRPr lang="pt-BR" sz="1400" dirty="0" smtClean="0"/>
+          </a:p>
+          <a:p>
+            <a:pPr algn="ctr"/>
+            <a:r>
+              <a:rPr lang="pt-BR" sz="1400" dirty="0" smtClean="0"/>
+              <a:t> RPM</a:t>
+            </a:r>
+            <a:endParaRPr lang="pt-BR" sz="1400" dirty="0"/>
+          </a:p>
+        </p:txBody>
+      </p:sp>
+      <p:cxnSp>
+        <p:nvCxnSpPr>
+          <p:cNvPr id="46" name="Conector reto 45"/>
+          <p:cNvCxnSpPr/>
+          <p:nvPr/>
+        </p:nvCxnSpPr>
+        <p:spPr>
+          <a:xfrm rot="-1800000">
+            <a:off x="3547268" y="1876425"/>
+            <a:ext cx="825500" cy="0"/>
+          </a:xfrm>
+          <a:prstGeom prst="line">
+            <a:avLst/>
+          </a:prstGeom>
+          <a:ln w="28575">
+            <a:solidFill>
+              <a:schemeClr val="tx1"/>
+            </a:solidFill>
+            <a:prstDash val="dash"/>
+          </a:ln>
+        </p:spPr>
+        <p:style>
+          <a:lnRef idx="1">
+            <a:schemeClr val="accent1"/>
+          </a:lnRef>
+          <a:fillRef idx="0">
+            <a:schemeClr val="accent1"/>
+          </a:fillRef>
+          <a:effectRef idx="0">
+            <a:schemeClr val="accent1"/>
+          </a:effectRef>
+          <a:fontRef idx="minor">
+            <a:schemeClr val="tx1"/>
+          </a:fontRef>
+        </p:style>
+      </p:cxnSp>
+      <p:cxnSp>
+        <p:nvCxnSpPr>
+          <p:cNvPr id="47" name="Conector reto 46"/>
+          <p:cNvCxnSpPr/>
+          <p:nvPr/>
+        </p:nvCxnSpPr>
+        <p:spPr>
+          <a:xfrm>
+            <a:off x="4317470" y="1670050"/>
+            <a:ext cx="1028700" cy="0"/>
+          </a:xfrm>
+          <a:prstGeom prst="line">
+            <a:avLst/>
+          </a:prstGeom>
+          <a:ln w="19050">
+            <a:solidFill>
+              <a:schemeClr val="tx1"/>
+            </a:solidFill>
+          </a:ln>
+        </p:spPr>
+        <p:style>
+          <a:lnRef idx="1">
+            <a:schemeClr val="accent1"/>
+          </a:lnRef>
+          <a:fillRef idx="0">
+            <a:schemeClr val="accent1"/>
+          </a:fillRef>
+          <a:effectRef idx="0">
+            <a:schemeClr val="accent1"/>
+          </a:effectRef>
+          <a:fontRef idx="minor">
+            <a:schemeClr val="tx1"/>
+          </a:fontRef>
+        </p:style>
+      </p:cxnSp>
+      <p:sp>
+        <p:nvSpPr>
+          <p:cNvPr id="48" name="CaixaDeTexto 47"/>
+          <p:cNvSpPr txBox="1"/>
+          <p:nvPr/>
+        </p:nvSpPr>
+        <p:spPr>
+          <a:xfrm>
+            <a:off x="4536611" y="1274808"/>
+            <a:ext cx="590418" cy="369332"/>
+          </a:xfrm>
+          <a:prstGeom prst="rect">
+            <a:avLst/>
+          </a:prstGeom>
+          <a:noFill/>
+        </p:spPr>
+        <p:txBody>
+          <a:bodyPr wrap="none" rtlCol="0">
+            <a:spAutoFit/>
+          </a:bodyPr>
+          <a:lstStyle/>
+          <a:p>
+            <a:pPr algn="ctr"/>
+            <a:r>
+              <a:rPr lang="pt-BR" dirty="0" err="1" smtClean="0"/>
+              <a:t>D</a:t>
+            </a:r>
+            <a:r>
+              <a:rPr lang="pt-BR" baseline="-25000" dirty="0" err="1" smtClean="0"/>
+              <a:t>máx</a:t>
+            </a:r>
+            <a:endParaRPr lang="pt-BR" dirty="0"/>
+          </a:p>
+        </p:txBody>
+      </p:sp>
+      <p:cxnSp>
+        <p:nvCxnSpPr>
+          <p:cNvPr id="49" name="Conector reto 48"/>
+          <p:cNvCxnSpPr/>
+          <p:nvPr/>
+        </p:nvCxnSpPr>
+        <p:spPr>
+          <a:xfrm rot="1800000">
+            <a:off x="3574256" y="3851277"/>
+            <a:ext cx="825500" cy="0"/>
+          </a:xfrm>
+          <a:prstGeom prst="line">
+            <a:avLst/>
+          </a:prstGeom>
+          <a:ln w="28575">
+            <a:solidFill>
+              <a:schemeClr val="tx1"/>
+            </a:solidFill>
+            <a:prstDash val="dash"/>
+          </a:ln>
+        </p:spPr>
+        <p:style>
+          <a:lnRef idx="1">
+            <a:schemeClr val="accent1"/>
+          </a:lnRef>
+          <a:fillRef idx="0">
+            <a:schemeClr val="accent1"/>
+          </a:fillRef>
+          <a:effectRef idx="0">
+            <a:schemeClr val="accent1"/>
+          </a:effectRef>
+          <a:fontRef idx="minor">
+            <a:schemeClr val="tx1"/>
+          </a:fontRef>
+        </p:style>
+      </p:cxnSp>
+      <p:cxnSp>
+        <p:nvCxnSpPr>
+          <p:cNvPr id="50" name="Conector reto 49"/>
+          <p:cNvCxnSpPr/>
+          <p:nvPr/>
+        </p:nvCxnSpPr>
+        <p:spPr>
+          <a:xfrm>
+            <a:off x="4344458" y="4051302"/>
+            <a:ext cx="1028700" cy="0"/>
+          </a:xfrm>
+          <a:prstGeom prst="line">
+            <a:avLst/>
+          </a:prstGeom>
+          <a:ln w="19050">
+            <a:solidFill>
+              <a:schemeClr val="tx1"/>
+            </a:solidFill>
+          </a:ln>
+        </p:spPr>
+        <p:style>
+          <a:lnRef idx="1">
+            <a:schemeClr val="accent1"/>
+          </a:lnRef>
+          <a:fillRef idx="0">
+            <a:schemeClr val="accent1"/>
+          </a:fillRef>
+          <a:effectRef idx="0">
+            <a:schemeClr val="accent1"/>
+          </a:effectRef>
+          <a:fontRef idx="minor">
+            <a:schemeClr val="tx1"/>
+          </a:fontRef>
+        </p:style>
+      </p:cxnSp>
+      <p:sp>
+        <p:nvSpPr>
+          <p:cNvPr id="51" name="CaixaDeTexto 50"/>
+          <p:cNvSpPr txBox="1"/>
+          <p:nvPr/>
+        </p:nvSpPr>
+        <p:spPr>
+          <a:xfrm>
+            <a:off x="4575718" y="4023848"/>
+            <a:ext cx="566181" cy="369332"/>
+          </a:xfrm>
+          <a:prstGeom prst="rect">
+            <a:avLst/>
+          </a:prstGeom>
+          <a:noFill/>
+        </p:spPr>
+        <p:txBody>
+          <a:bodyPr wrap="none" rtlCol="0">
+            <a:spAutoFit/>
+          </a:bodyPr>
+          <a:lstStyle/>
+          <a:p>
+            <a:pPr algn="ctr"/>
+            <a:r>
+              <a:rPr lang="pt-BR" dirty="0" err="1" smtClean="0"/>
+              <a:t>D</a:t>
+            </a:r>
+            <a:r>
+              <a:rPr lang="pt-BR" baseline="-25000" dirty="0" err="1" smtClean="0"/>
+              <a:t>mín</a:t>
+            </a:r>
+            <a:endParaRPr lang="pt-BR" dirty="0"/>
+          </a:p>
+        </p:txBody>
+      </p:sp>
+      <p:sp>
+        <p:nvSpPr>
+          <p:cNvPr id="90" name="CaixaDeTexto 89"/>
+          <p:cNvSpPr txBox="1"/>
+          <p:nvPr/>
+        </p:nvSpPr>
+        <p:spPr>
+          <a:xfrm>
+            <a:off x="4345686" y="2350936"/>
+            <a:ext cx="1026242" cy="923330"/>
+          </a:xfrm>
+          <a:prstGeom prst="rect">
+            <a:avLst/>
+          </a:prstGeom>
+          <a:noFill/>
+        </p:spPr>
+        <p:txBody>
+          <a:bodyPr wrap="none" rtlCol="0">
+            <a:spAutoFit/>
+          </a:bodyPr>
+          <a:lstStyle/>
+          <a:p>
+            <a:pPr algn="ctr"/>
+            <a:r>
+              <a:rPr lang="pt-BR" b="1" dirty="0" smtClean="0"/>
+              <a:t>ADC</a:t>
+            </a:r>
+          </a:p>
+          <a:p>
+            <a:pPr algn="ctr"/>
+            <a:r>
+              <a:rPr lang="pt-BR" b="1" dirty="0" smtClean="0"/>
+              <a:t>14 bits</a:t>
+            </a:r>
+          </a:p>
+          <a:p>
+            <a:pPr algn="ctr"/>
+            <a:r>
+              <a:rPr lang="pt-BR" b="1" dirty="0" smtClean="0"/>
+              <a:t>0V </a:t>
+            </a:r>
+            <a:r>
+              <a:rPr lang="pt-BR" b="1" dirty="0" smtClean="0"/>
+              <a:t>a +5V</a:t>
+            </a:r>
+            <a:endParaRPr lang="pt-BR" b="1" dirty="0"/>
+          </a:p>
+        </p:txBody>
+      </p:sp>
+      <p:sp>
+        <p:nvSpPr>
+          <p:cNvPr id="91" name="CaixaDeTexto 90"/>
+          <p:cNvSpPr txBox="1"/>
+          <p:nvPr/>
+        </p:nvSpPr>
+        <p:spPr>
+          <a:xfrm>
+            <a:off x="4490759" y="3769848"/>
+            <a:ext cx="736100" cy="307777"/>
+          </a:xfrm>
+          <a:prstGeom prst="rect">
+            <a:avLst/>
+          </a:prstGeom>
+          <a:noFill/>
+        </p:spPr>
+        <p:txBody>
+          <a:bodyPr wrap="none" rtlCol="0">
+            <a:spAutoFit/>
+          </a:bodyPr>
+          <a:lstStyle/>
+          <a:p>
+            <a:pPr algn="ctr"/>
+            <a:r>
+              <a:rPr lang="pt-BR" sz="1400" dirty="0" smtClean="0"/>
+              <a:t>0h0000</a:t>
+            </a:r>
+            <a:endParaRPr lang="pt-BR" sz="1400" dirty="0"/>
+          </a:p>
+        </p:txBody>
+      </p:sp>
+      <p:sp>
+        <p:nvSpPr>
+          <p:cNvPr id="92" name="CaixaDeTexto 91"/>
+          <p:cNvSpPr txBox="1"/>
+          <p:nvPr/>
+        </p:nvSpPr>
+        <p:spPr>
+          <a:xfrm>
+            <a:off x="4478199" y="1636759"/>
+            <a:ext cx="707245" cy="307777"/>
+          </a:xfrm>
+          <a:prstGeom prst="rect">
+            <a:avLst/>
+          </a:prstGeom>
+          <a:noFill/>
+        </p:spPr>
+        <p:txBody>
+          <a:bodyPr wrap="none" rtlCol="0">
+            <a:spAutoFit/>
+          </a:bodyPr>
+          <a:lstStyle/>
+          <a:p>
+            <a:pPr algn="ctr"/>
+            <a:r>
+              <a:rPr lang="pt-BR" sz="1400" dirty="0" smtClean="0"/>
+              <a:t>0h3FFF</a:t>
+            </a:r>
+            <a:endParaRPr lang="pt-BR" sz="1400" dirty="0"/>
+          </a:p>
+        </p:txBody>
+      </p:sp>
+    </p:spTree>
+    <p:extLst>
+      <p:ext uri="{BB962C8B-B14F-4D97-AF65-F5344CB8AC3E}">
+        <p14:creationId xmlns:p14="http://schemas.microsoft.com/office/powerpoint/2010/main" val="1922486253"/>
       </p:ext>
     </p:extLst>
   </p:cSld>

</xml_diff>